<commit_message>
merged input from Alex
</commit_message>
<xml_diff>
--- a/ietf116-iepg-yang-push-data-mesh-integration.pptx
+++ b/ietf116-iepg-yang-push-data-mesh-integration.pptx
@@ -1853,7 +1853,7 @@
           <a:p>
             <a:fld id="{E5E705E9-673F-4AC4-B29E-A7B26F3B8523}" type="datetimeFigureOut">
               <a:rPr lang="de-CH" smtClean="0"/>
-              <a:t>19.03.2023</a:t>
+              <a:t>20.03.2023</a:t>
             </a:fld>
             <a:endParaRPr lang="de-CH"/>
           </a:p>
@@ -2443,7 +2443,7 @@
           <a:p>
             <a:fld id="{9E9B238C-2335-4007-98C9-471C02CC43B6}" type="datetimeFigureOut">
               <a:rPr lang="de-CH" smtClean="0"/>
-              <a:t>19.03.2023</a:t>
+              <a:t>20.03.2023</a:t>
             </a:fld>
             <a:endParaRPr lang="de-CH"/>
           </a:p>
@@ -2643,7 +2643,7 @@
           <a:p>
             <a:fld id="{9E9B238C-2335-4007-98C9-471C02CC43B6}" type="datetimeFigureOut">
               <a:rPr lang="de-CH" smtClean="0"/>
-              <a:t>19.03.2023</a:t>
+              <a:t>20.03.2023</a:t>
             </a:fld>
             <a:endParaRPr lang="de-CH"/>
           </a:p>
@@ -2853,7 +2853,7 @@
           <a:p>
             <a:fld id="{9E9B238C-2335-4007-98C9-471C02CC43B6}" type="datetimeFigureOut">
               <a:rPr lang="de-CH" smtClean="0"/>
-              <a:t>19.03.2023</a:t>
+              <a:t>20.03.2023</a:t>
             </a:fld>
             <a:endParaRPr lang="de-CH"/>
           </a:p>
@@ -4295,7 +4295,7 @@
           <a:p>
             <a:fld id="{9E9B238C-2335-4007-98C9-471C02CC43B6}" type="datetimeFigureOut">
               <a:rPr lang="de-CH" smtClean="0"/>
-              <a:t>19.03.2023</a:t>
+              <a:t>20.03.2023</a:t>
             </a:fld>
             <a:endParaRPr lang="de-CH"/>
           </a:p>
@@ -4571,7 +4571,7 @@
           <a:p>
             <a:fld id="{9E9B238C-2335-4007-98C9-471C02CC43B6}" type="datetimeFigureOut">
               <a:rPr lang="de-CH" smtClean="0"/>
-              <a:t>19.03.2023</a:t>
+              <a:t>20.03.2023</a:t>
             </a:fld>
             <a:endParaRPr lang="de-CH"/>
           </a:p>
@@ -4839,7 +4839,7 @@
           <a:p>
             <a:fld id="{9E9B238C-2335-4007-98C9-471C02CC43B6}" type="datetimeFigureOut">
               <a:rPr lang="de-CH" smtClean="0"/>
-              <a:t>19.03.2023</a:t>
+              <a:t>20.03.2023</a:t>
             </a:fld>
             <a:endParaRPr lang="de-CH"/>
           </a:p>
@@ -5254,7 +5254,7 @@
           <a:p>
             <a:fld id="{9E9B238C-2335-4007-98C9-471C02CC43B6}" type="datetimeFigureOut">
               <a:rPr lang="de-CH" smtClean="0"/>
-              <a:t>19.03.2023</a:t>
+              <a:t>20.03.2023</a:t>
             </a:fld>
             <a:endParaRPr lang="de-CH"/>
           </a:p>
@@ -5396,7 +5396,7 @@
           <a:p>
             <a:fld id="{9E9B238C-2335-4007-98C9-471C02CC43B6}" type="datetimeFigureOut">
               <a:rPr lang="de-CH" smtClean="0"/>
-              <a:t>19.03.2023</a:t>
+              <a:t>20.03.2023</a:t>
             </a:fld>
             <a:endParaRPr lang="de-CH"/>
           </a:p>
@@ -5509,7 +5509,7 @@
           <a:p>
             <a:fld id="{9E9B238C-2335-4007-98C9-471C02CC43B6}" type="datetimeFigureOut">
               <a:rPr lang="de-CH" smtClean="0"/>
-              <a:t>19.03.2023</a:t>
+              <a:t>20.03.2023</a:t>
             </a:fld>
             <a:endParaRPr lang="de-CH"/>
           </a:p>
@@ -5822,7 +5822,7 @@
           <a:p>
             <a:fld id="{9E9B238C-2335-4007-98C9-471C02CC43B6}" type="datetimeFigureOut">
               <a:rPr lang="de-CH" smtClean="0"/>
-              <a:t>19.03.2023</a:t>
+              <a:t>20.03.2023</a:t>
             </a:fld>
             <a:endParaRPr lang="de-CH"/>
           </a:p>
@@ -6111,7 +6111,7 @@
           <a:p>
             <a:fld id="{9E9B238C-2335-4007-98C9-471C02CC43B6}" type="datetimeFigureOut">
               <a:rPr lang="de-CH" smtClean="0"/>
-              <a:t>19.03.2023</a:t>
+              <a:t>20.03.2023</a:t>
             </a:fld>
             <a:endParaRPr lang="de-CH"/>
           </a:p>
@@ -6354,7 +6354,7 @@
           <a:p>
             <a:fld id="{9E9B238C-2335-4007-98C9-471C02CC43B6}" type="datetimeFigureOut">
               <a:rPr lang="de-CH" smtClean="0"/>
-              <a:t>19.03.2023</a:t>
+              <a:t>20.03.2023</a:t>
             </a:fld>
             <a:endParaRPr lang="de-CH"/>
           </a:p>
@@ -7575,7 +7575,7 @@
                   <a:srgbClr val="FF0000"/>
                 </a:solidFill>
               </a:rPr>
-              <a:t>-netconf-</a:t>
+              <a:t>-</a:t>
             </a:r>
             <a:r>
               <a:rPr lang="en-US" sz="1800" b="1" dirty="0" err="1">
@@ -7583,7 +7583,7 @@
                   <a:srgbClr val="FF0000"/>
                 </a:solidFill>
               </a:rPr>
-              <a:t>notif</a:t>
+              <a:t>netconf</a:t>
             </a:r>
             <a:r>
               <a:rPr lang="en-US" sz="1800" b="1" dirty="0">
@@ -7591,16 +7591,151 @@
                   <a:srgbClr val="FF0000"/>
                 </a:solidFill>
               </a:rPr>
+              <a:t>-</a:t>
+            </a:r>
+            <a:r>
+              <a:rPr lang="en-US" sz="1800" b="1" dirty="0" err="1">
+                <a:solidFill>
+                  <a:srgbClr val="FF0000"/>
+                </a:solidFill>
+              </a:rPr>
+              <a:t>notif</a:t>
+            </a:r>
+            <a:r>
+              <a:rPr lang="en-US" sz="1800" b="1" dirty="0">
+                <a:solidFill>
+                  <a:srgbClr val="FF0000"/>
+                </a:solidFill>
+              </a:rPr>
               <a:t>-yang</a:t>
             </a:r>
             <a:r>
               <a:rPr lang="en-US" sz="1800" dirty="0"/>
-              <a:t> the schema is also defined as a YANG module. </a:t>
+              <a:t> updates RFC 5277 by defining the schema as a YANG module. </a:t>
+            </a:r>
+          </a:p>
+          <a:p>
+            <a:r>
+              <a:rPr lang="de-CH" sz="1800" b="1" dirty="0">
+                <a:effectLst/>
+                <a:latin typeface="Calibri" panose="020F0502020204030204" pitchFamily="34" charset="0"/>
+                <a:ea typeface="Times New Roman" panose="02020603050405020304" pitchFamily="18" charset="0"/>
+              </a:rPr>
+              <a:t>This </a:t>
+            </a:r>
+            <a:r>
+              <a:rPr lang="de-CH" sz="1800" b="1" dirty="0" err="1">
+                <a:effectLst/>
+                <a:latin typeface="Calibri" panose="020F0502020204030204" pitchFamily="34" charset="0"/>
+                <a:ea typeface="Times New Roman" panose="02020603050405020304" pitchFamily="18" charset="0"/>
+              </a:rPr>
+              <a:t>enables</a:t>
+            </a:r>
+            <a:r>
+              <a:rPr lang="de-CH" sz="1800" b="1" dirty="0">
+                <a:effectLst/>
+                <a:latin typeface="Calibri" panose="020F0502020204030204" pitchFamily="34" charset="0"/>
+                <a:ea typeface="Times New Roman" panose="02020603050405020304" pitchFamily="18" charset="0"/>
+              </a:rPr>
+              <a:t> YANG-push </a:t>
             </a:r>
             <a:r>
               <a:rPr lang="en-US" sz="1800" b="1" dirty="0"/>
-              <a:t>Enabling now to define semantics for the entire YANG push message.</a:t>
-            </a:r>
+              <a:t>to define semantics for the entire YANG push message</a:t>
+            </a:r>
+            <a:r>
+              <a:rPr lang="de-CH" sz="1800" b="1" dirty="0"/>
+              <a:t> and </a:t>
+            </a:r>
+            <a:r>
+              <a:rPr lang="de-CH" sz="1800" b="1" dirty="0">
+                <a:effectLst/>
+                <a:latin typeface="Calibri" panose="020F0502020204030204" pitchFamily="34" charset="0"/>
+                <a:ea typeface="Times New Roman" panose="02020603050405020304" pitchFamily="18" charset="0"/>
+              </a:rPr>
+              <a:t>use </a:t>
+            </a:r>
+            <a:r>
+              <a:rPr lang="de-CH" sz="1800" b="1" dirty="0" err="1">
+                <a:effectLst/>
+                <a:latin typeface="Calibri" panose="020F0502020204030204" pitchFamily="34" charset="0"/>
+                <a:ea typeface="Times New Roman" panose="02020603050405020304" pitchFamily="18" charset="0"/>
+              </a:rPr>
+              <a:t>other</a:t>
+            </a:r>
+            <a:r>
+              <a:rPr lang="de-CH" sz="1800" b="1" dirty="0">
+                <a:effectLst/>
+                <a:latin typeface="Calibri" panose="020F0502020204030204" pitchFamily="34" charset="0"/>
+                <a:ea typeface="Times New Roman" panose="02020603050405020304" pitchFamily="18" charset="0"/>
+              </a:rPr>
+              <a:t> </a:t>
+            </a:r>
+            <a:r>
+              <a:rPr lang="de-CH" sz="1800" b="1" dirty="0" err="1">
+                <a:effectLst/>
+                <a:latin typeface="Calibri" panose="020F0502020204030204" pitchFamily="34" charset="0"/>
+                <a:ea typeface="Times New Roman" panose="02020603050405020304" pitchFamily="18" charset="0"/>
+              </a:rPr>
+              <a:t>encodings</a:t>
+            </a:r>
+            <a:r>
+              <a:rPr lang="de-CH" sz="1800" b="1" dirty="0">
+                <a:effectLst/>
+                <a:latin typeface="Calibri" panose="020F0502020204030204" pitchFamily="34" charset="0"/>
+                <a:ea typeface="Times New Roman" panose="02020603050405020304" pitchFamily="18" charset="0"/>
+              </a:rPr>
+              <a:t> </a:t>
+            </a:r>
+            <a:r>
+              <a:rPr lang="de-CH" sz="1800" dirty="0" err="1">
+                <a:effectLst/>
+                <a:latin typeface="Calibri" panose="020F0502020204030204" pitchFamily="34" charset="0"/>
+                <a:ea typeface="Times New Roman" panose="02020603050405020304" pitchFamily="18" charset="0"/>
+              </a:rPr>
+              <a:t>than</a:t>
+            </a:r>
+            <a:r>
+              <a:rPr lang="de-CH" sz="1800" dirty="0">
+                <a:effectLst/>
+                <a:latin typeface="Calibri" panose="020F0502020204030204" pitchFamily="34" charset="0"/>
+                <a:ea typeface="Times New Roman" panose="02020603050405020304" pitchFamily="18" charset="0"/>
+              </a:rPr>
+              <a:t> XML such </a:t>
+            </a:r>
+            <a:r>
+              <a:rPr lang="de-CH" sz="1800" dirty="0" err="1">
+                <a:effectLst/>
+                <a:latin typeface="Calibri" panose="020F0502020204030204" pitchFamily="34" charset="0"/>
+                <a:ea typeface="Times New Roman" panose="02020603050405020304" pitchFamily="18" charset="0"/>
+              </a:rPr>
+              <a:t>as</a:t>
+            </a:r>
+            <a:r>
+              <a:rPr lang="de-CH" sz="1800" dirty="0">
+                <a:effectLst/>
+                <a:latin typeface="Calibri" panose="020F0502020204030204" pitchFamily="34" charset="0"/>
+                <a:ea typeface="Times New Roman" panose="02020603050405020304" pitchFamily="18" charset="0"/>
+              </a:rPr>
+              <a:t> YANG-JSON RFC 7951 </a:t>
+            </a:r>
+            <a:r>
+              <a:rPr lang="de-CH" sz="1800" dirty="0" err="1">
+                <a:effectLst/>
+                <a:latin typeface="Calibri" panose="020F0502020204030204" pitchFamily="34" charset="0"/>
+                <a:ea typeface="Times New Roman" panose="02020603050405020304" pitchFamily="18" charset="0"/>
+              </a:rPr>
+              <a:t>or</a:t>
+            </a:r>
+            <a:r>
+              <a:rPr lang="de-CH" sz="1800">
+                <a:effectLst/>
+                <a:latin typeface="Calibri" panose="020F0502020204030204" pitchFamily="34" charset="0"/>
+                <a:ea typeface="Times New Roman" panose="02020603050405020304" pitchFamily="18" charset="0"/>
+              </a:rPr>
+              <a:t> YANG-CBOR RFC 9264.</a:t>
+            </a:r>
+            <a:endParaRPr lang="en-US" sz="1800" b="1" dirty="0"/>
           </a:p>
         </p:txBody>
       </p:sp>
@@ -17521,7 +17656,7 @@
           <p:nvPr>
             <p:extLst>
               <p:ext uri="{D42A27DB-BD31-4B8C-83A1-F6EECF244321}">
-                <p14:modId xmlns:p14="http://schemas.microsoft.com/office/powerpoint/2010/main" val="4095072006"/>
+                <p14:modId xmlns:p14="http://schemas.microsoft.com/office/powerpoint/2010/main" val="1188494384"/>
               </p:ext>
             </p:extLst>
           </p:nvPr>
@@ -17721,7 +17856,7 @@
                     <a:p>
                       <a:r>
                         <a:rPr lang="en-US" sz="1600" noProof="0" dirty="0"/>
-                        <a:t>JSON and XML in RFC8040, CBOR in RFC9254</a:t>
+                        <a:t>XML in RFC7950, JSON in RFC7951, CBOR in RFC9254</a:t>
                       </a:r>
                     </a:p>
                   </a:txBody>

</xml_diff>

<commit_message>
nit reported from Pierre
</commit_message>
<xml_diff>
--- a/ietf116-iepg-yang-push-data-mesh-integration.pptx
+++ b/ietf116-iepg-yang-push-data-mesh-integration.pptx
@@ -127,14 +127,6 @@
     </p:ext>
   </p:extLst>
 </p:presentation>
-</file>
-
-<file path=ppt/revisionInfo.xml><?xml version="1.0" encoding="utf-8"?>
-<p1510:revInfo xmlns:a="http://schemas.openxmlformats.org/drawingml/2006/main" xmlns:r="http://schemas.openxmlformats.org/officeDocument/2006/relationships" xmlns:p1510="http://schemas.microsoft.com/office/powerpoint/2015/10/main">
-  <p1510:revLst>
-    <p1510:client id="{09A627D1-69A9-49B0-BB16-E2155A816E4A}" v="50" dt="2022-11-05T20:43:33.022"/>
-  </p1510:revLst>
-</p1510:revInfo>
 </file>
 
 <file path=ppt/changesInfos/changesInfo1.xml><?xml version="1.0" encoding="utf-8"?>
@@ -1768,6 +1760,30 @@
       </pc:sldChg>
     </pc:docChg>
   </pc:docChgLst>
+  <pc:docChgLst>
+    <pc:chgData name="Graf Thomas, INI-NET-VNC-HCS" userId="487bc3e3-9ce7-4cdd-b7b4-8899ea88d289" providerId="ADAL" clId="{B85BB025-7FD4-4CDD-9546-FE0DE5B148FA}"/>
+    <pc:docChg chg="modSld">
+      <pc:chgData name="Graf Thomas, INI-NET-VNC-HCS" userId="487bc3e3-9ce7-4cdd-b7b4-8899ea88d289" providerId="ADAL" clId="{B85BB025-7FD4-4CDD-9546-FE0DE5B148FA}" dt="2023-03-21T13:29:33.960" v="0" actId="20577"/>
+      <pc:docMkLst>
+        <pc:docMk/>
+      </pc:docMkLst>
+      <pc:sldChg chg="modSp mod">
+        <pc:chgData name="Graf Thomas, INI-NET-VNC-HCS" userId="487bc3e3-9ce7-4cdd-b7b4-8899ea88d289" providerId="ADAL" clId="{B85BB025-7FD4-4CDD-9546-FE0DE5B148FA}" dt="2023-03-21T13:29:33.960" v="0" actId="20577"/>
+        <pc:sldMkLst>
+          <pc:docMk/>
+          <pc:sldMk cId="3241116723" sldId="2145706200"/>
+        </pc:sldMkLst>
+        <pc:spChg chg="mod">
+          <ac:chgData name="Graf Thomas, INI-NET-VNC-HCS" userId="487bc3e3-9ce7-4cdd-b7b4-8899ea88d289" providerId="ADAL" clId="{B85BB025-7FD4-4CDD-9546-FE0DE5B148FA}" dt="2023-03-21T13:29:33.960" v="0" actId="20577"/>
+          <ac:spMkLst>
+            <pc:docMk/>
+            <pc:sldMk cId="3241116723" sldId="2145706200"/>
+            <ac:spMk id="4" creationId="{D81DEC37-A600-4F6C-AE22-C81D97BEC259}"/>
+          </ac:spMkLst>
+        </pc:spChg>
+      </pc:sldChg>
+    </pc:docChg>
+  </pc:docChgLst>
 </pc:chgInfo>
 </file>
 
@@ -1853,7 +1869,7 @@
           <a:p>
             <a:fld id="{E5E705E9-673F-4AC4-B29E-A7B26F3B8523}" type="datetimeFigureOut">
               <a:rPr lang="de-CH" smtClean="0"/>
-              <a:t>20.03.2023</a:t>
+              <a:t>21.03.2023</a:t>
             </a:fld>
             <a:endParaRPr lang="de-CH"/>
           </a:p>
@@ -2443,7 +2459,7 @@
           <a:p>
             <a:fld id="{9E9B238C-2335-4007-98C9-471C02CC43B6}" type="datetimeFigureOut">
               <a:rPr lang="de-CH" smtClean="0"/>
-              <a:t>20.03.2023</a:t>
+              <a:t>21.03.2023</a:t>
             </a:fld>
             <a:endParaRPr lang="de-CH"/>
           </a:p>
@@ -2643,7 +2659,7 @@
           <a:p>
             <a:fld id="{9E9B238C-2335-4007-98C9-471C02CC43B6}" type="datetimeFigureOut">
               <a:rPr lang="de-CH" smtClean="0"/>
-              <a:t>20.03.2023</a:t>
+              <a:t>21.03.2023</a:t>
             </a:fld>
             <a:endParaRPr lang="de-CH"/>
           </a:p>
@@ -2853,7 +2869,7 @@
           <a:p>
             <a:fld id="{9E9B238C-2335-4007-98C9-471C02CC43B6}" type="datetimeFigureOut">
               <a:rPr lang="de-CH" smtClean="0"/>
-              <a:t>20.03.2023</a:t>
+              <a:t>21.03.2023</a:t>
             </a:fld>
             <a:endParaRPr lang="de-CH"/>
           </a:p>
@@ -4295,7 +4311,7 @@
           <a:p>
             <a:fld id="{9E9B238C-2335-4007-98C9-471C02CC43B6}" type="datetimeFigureOut">
               <a:rPr lang="de-CH" smtClean="0"/>
-              <a:t>20.03.2023</a:t>
+              <a:t>21.03.2023</a:t>
             </a:fld>
             <a:endParaRPr lang="de-CH"/>
           </a:p>
@@ -4571,7 +4587,7 @@
           <a:p>
             <a:fld id="{9E9B238C-2335-4007-98C9-471C02CC43B6}" type="datetimeFigureOut">
               <a:rPr lang="de-CH" smtClean="0"/>
-              <a:t>20.03.2023</a:t>
+              <a:t>21.03.2023</a:t>
             </a:fld>
             <a:endParaRPr lang="de-CH"/>
           </a:p>
@@ -4839,7 +4855,7 @@
           <a:p>
             <a:fld id="{9E9B238C-2335-4007-98C9-471C02CC43B6}" type="datetimeFigureOut">
               <a:rPr lang="de-CH" smtClean="0"/>
-              <a:t>20.03.2023</a:t>
+              <a:t>21.03.2023</a:t>
             </a:fld>
             <a:endParaRPr lang="de-CH"/>
           </a:p>
@@ -5254,7 +5270,7 @@
           <a:p>
             <a:fld id="{9E9B238C-2335-4007-98C9-471C02CC43B6}" type="datetimeFigureOut">
               <a:rPr lang="de-CH" smtClean="0"/>
-              <a:t>20.03.2023</a:t>
+              <a:t>21.03.2023</a:t>
             </a:fld>
             <a:endParaRPr lang="de-CH"/>
           </a:p>
@@ -5396,7 +5412,7 @@
           <a:p>
             <a:fld id="{9E9B238C-2335-4007-98C9-471C02CC43B6}" type="datetimeFigureOut">
               <a:rPr lang="de-CH" smtClean="0"/>
-              <a:t>20.03.2023</a:t>
+              <a:t>21.03.2023</a:t>
             </a:fld>
             <a:endParaRPr lang="de-CH"/>
           </a:p>
@@ -5509,7 +5525,7 @@
           <a:p>
             <a:fld id="{9E9B238C-2335-4007-98C9-471C02CC43B6}" type="datetimeFigureOut">
               <a:rPr lang="de-CH" smtClean="0"/>
-              <a:t>20.03.2023</a:t>
+              <a:t>21.03.2023</a:t>
             </a:fld>
             <a:endParaRPr lang="de-CH"/>
           </a:p>
@@ -5822,7 +5838,7 @@
           <a:p>
             <a:fld id="{9E9B238C-2335-4007-98C9-471C02CC43B6}" type="datetimeFigureOut">
               <a:rPr lang="de-CH" smtClean="0"/>
-              <a:t>20.03.2023</a:t>
+              <a:t>21.03.2023</a:t>
             </a:fld>
             <a:endParaRPr lang="de-CH"/>
           </a:p>
@@ -6111,7 +6127,7 @@
           <a:p>
             <a:fld id="{9E9B238C-2335-4007-98C9-471C02CC43B6}" type="datetimeFigureOut">
               <a:rPr lang="de-CH" smtClean="0"/>
-              <a:t>20.03.2023</a:t>
+              <a:t>21.03.2023</a:t>
             </a:fld>
             <a:endParaRPr lang="de-CH"/>
           </a:p>
@@ -6354,7 +6370,7 @@
           <a:p>
             <a:fld id="{9E9B238C-2335-4007-98C9-471C02CC43B6}" type="datetimeFigureOut">
               <a:rPr lang="de-CH" smtClean="0"/>
-              <a:t>20.03.2023</a:t>
+              <a:t>21.03.2023</a:t>
             </a:fld>
             <a:endParaRPr lang="de-CH"/>
           </a:p>
@@ -13685,11 +13701,19 @@
             </a:pPr>
             <a:r>
               <a:rPr lang="en-US" sz="1800" b="1" dirty="0"/>
-              <a:t>A single link down </a:t>
+              <a:t>A single link </a:t>
+            </a:r>
+            <a:r>
+              <a:rPr lang="en-US" sz="1800" b="1"/>
+              <a:t>down </a:t>
+            </a:r>
+            <a:r>
+              <a:rPr lang="en-US" sz="1800"/>
+              <a:t>results </a:t>
             </a:r>
             <a:r>
               <a:rPr lang="en-US" sz="1800" dirty="0"/>
-              <a:t>result in multiple device topology, control-plane and forwarding-plane events being exposed at different times.</a:t>
+              <a:t>in multiple device topology, control-plane and forwarding-plane events being exposed at different times.</a:t>
             </a:r>
           </a:p>
           <a:p>

</xml_diff>